<commit_message>
change logo of hkust
</commit_message>
<xml_diff>
--- a/text/Program.pptx
+++ b/text/Program.pptx
@@ -247,7 +247,7 @@
           <a:p>
             <a:fld id="{D0B35E32-9907-4F95-B048-8C7490A1B878}" type="datetimeFigureOut">
               <a:rPr lang="zh-CN" altLang="en-US" smtClean="0"/>
-              <a:t>2018/5/11</a:t>
+              <a:t>2018/6/5</a:t>
             </a:fld>
             <a:endParaRPr lang="zh-CN" altLang="en-US"/>
           </a:p>
@@ -417,7 +417,7 @@
           <a:p>
             <a:fld id="{D0B35E32-9907-4F95-B048-8C7490A1B878}" type="datetimeFigureOut">
               <a:rPr lang="zh-CN" altLang="en-US" smtClean="0"/>
-              <a:t>2018/5/11</a:t>
+              <a:t>2018/6/5</a:t>
             </a:fld>
             <a:endParaRPr lang="zh-CN" altLang="en-US"/>
           </a:p>
@@ -597,7 +597,7 @@
           <a:p>
             <a:fld id="{D0B35E32-9907-4F95-B048-8C7490A1B878}" type="datetimeFigureOut">
               <a:rPr lang="zh-CN" altLang="en-US" smtClean="0"/>
-              <a:t>2018/5/11</a:t>
+              <a:t>2018/6/5</a:t>
             </a:fld>
             <a:endParaRPr lang="zh-CN" altLang="en-US"/>
           </a:p>
@@ -767,7 +767,7 @@
           <a:p>
             <a:fld id="{D0B35E32-9907-4F95-B048-8C7490A1B878}" type="datetimeFigureOut">
               <a:rPr lang="zh-CN" altLang="en-US" smtClean="0"/>
-              <a:t>2018/5/11</a:t>
+              <a:t>2018/6/5</a:t>
             </a:fld>
             <a:endParaRPr lang="zh-CN" altLang="en-US"/>
           </a:p>
@@ -1013,7 +1013,7 @@
           <a:p>
             <a:fld id="{D0B35E32-9907-4F95-B048-8C7490A1B878}" type="datetimeFigureOut">
               <a:rPr lang="zh-CN" altLang="en-US" smtClean="0"/>
-              <a:t>2018/5/11</a:t>
+              <a:t>2018/6/5</a:t>
             </a:fld>
             <a:endParaRPr lang="zh-CN" altLang="en-US"/>
           </a:p>
@@ -1245,7 +1245,7 @@
           <a:p>
             <a:fld id="{D0B35E32-9907-4F95-B048-8C7490A1B878}" type="datetimeFigureOut">
               <a:rPr lang="zh-CN" altLang="en-US" smtClean="0"/>
-              <a:t>2018/5/11</a:t>
+              <a:t>2018/6/5</a:t>
             </a:fld>
             <a:endParaRPr lang="zh-CN" altLang="en-US"/>
           </a:p>
@@ -1612,7 +1612,7 @@
           <a:p>
             <a:fld id="{D0B35E32-9907-4F95-B048-8C7490A1B878}" type="datetimeFigureOut">
               <a:rPr lang="zh-CN" altLang="en-US" smtClean="0"/>
-              <a:t>2018/5/11</a:t>
+              <a:t>2018/6/5</a:t>
             </a:fld>
             <a:endParaRPr lang="zh-CN" altLang="en-US"/>
           </a:p>
@@ -1730,7 +1730,7 @@
           <a:p>
             <a:fld id="{D0B35E32-9907-4F95-B048-8C7490A1B878}" type="datetimeFigureOut">
               <a:rPr lang="zh-CN" altLang="en-US" smtClean="0"/>
-              <a:t>2018/5/11</a:t>
+              <a:t>2018/6/5</a:t>
             </a:fld>
             <a:endParaRPr lang="zh-CN" altLang="en-US"/>
           </a:p>
@@ -1825,7 +1825,7 @@
           <a:p>
             <a:fld id="{D0B35E32-9907-4F95-B048-8C7490A1B878}" type="datetimeFigureOut">
               <a:rPr lang="zh-CN" altLang="en-US" smtClean="0"/>
-              <a:t>2018/5/11</a:t>
+              <a:t>2018/6/5</a:t>
             </a:fld>
             <a:endParaRPr lang="zh-CN" altLang="en-US"/>
           </a:p>
@@ -2102,7 +2102,7 @@
           <a:p>
             <a:fld id="{D0B35E32-9907-4F95-B048-8C7490A1B878}" type="datetimeFigureOut">
               <a:rPr lang="zh-CN" altLang="en-US" smtClean="0"/>
-              <a:t>2018/5/11</a:t>
+              <a:t>2018/6/5</a:t>
             </a:fld>
             <a:endParaRPr lang="zh-CN" altLang="en-US"/>
           </a:p>
@@ -2355,7 +2355,7 @@
           <a:p>
             <a:fld id="{D0B35E32-9907-4F95-B048-8C7490A1B878}" type="datetimeFigureOut">
               <a:rPr lang="zh-CN" altLang="en-US" smtClean="0"/>
-              <a:t>2018/5/11</a:t>
+              <a:t>2018/6/5</a:t>
             </a:fld>
             <a:endParaRPr lang="zh-CN" altLang="en-US"/>
           </a:p>
@@ -2568,7 +2568,7 @@
           <a:p>
             <a:fld id="{D0B35E32-9907-4F95-B048-8C7490A1B878}" type="datetimeFigureOut">
               <a:rPr lang="zh-CN" altLang="en-US" smtClean="0"/>
-              <a:t>2018/5/11</a:t>
+              <a:t>2018/6/5</a:t>
             </a:fld>
             <a:endParaRPr lang="zh-CN" altLang="en-US"/>
           </a:p>
@@ -3256,6 +3256,106 @@
           </a:p>
         </p:txBody>
       </p:sp>
+      <p:grpSp>
+        <p:nvGrpSpPr>
+          <p:cNvPr id="5" name="组合 4"/>
+          <p:cNvGrpSpPr/>
+          <p:nvPr/>
+        </p:nvGrpSpPr>
+        <p:grpSpPr>
+          <a:xfrm>
+            <a:off x="363087" y="1254798"/>
+            <a:ext cx="2961905" cy="3169552"/>
+            <a:chOff x="363087" y="1254798"/>
+            <a:chExt cx="2961905" cy="3169552"/>
+          </a:xfrm>
+        </p:grpSpPr>
+        <p:pic>
+          <p:nvPicPr>
+            <p:cNvPr id="3" name="图片 2"/>
+            <p:cNvPicPr>
+              <a:picLocks noChangeAspect="1"/>
+            </p:cNvPicPr>
+            <p:nvPr/>
+          </p:nvPicPr>
+          <p:blipFill>
+            <a:blip r:embed="rId2">
+              <a:extLst>
+                <a:ext uri="{28A0092B-C50C-407E-A947-70E740481C1C}">
+                  <a14:useLocalDpi xmlns:a14="http://schemas.microsoft.com/office/drawing/2010/main" val="0"/>
+                </a:ext>
+              </a:extLst>
+            </a:blip>
+            <a:stretch>
+              <a:fillRect/>
+            </a:stretch>
+          </p:blipFill>
+          <p:spPr>
+            <a:xfrm>
+              <a:off x="363087" y="1254798"/>
+              <a:ext cx="2961905" cy="2647619"/>
+            </a:xfrm>
+            <a:prstGeom prst="rect">
+              <a:avLst/>
+            </a:prstGeom>
+          </p:spPr>
+        </p:pic>
+        <p:sp>
+          <p:nvSpPr>
+            <p:cNvPr id="4" name="文本框 3"/>
+            <p:cNvSpPr txBox="1"/>
+            <p:nvPr/>
+          </p:nvSpPr>
+          <p:spPr>
+            <a:xfrm>
+              <a:off x="443655" y="3778019"/>
+              <a:ext cx="2800767" cy="646331"/>
+            </a:xfrm>
+            <a:prstGeom prst="rect">
+              <a:avLst/>
+            </a:prstGeom>
+            <a:noFill/>
+          </p:spPr>
+          <p:txBody>
+            <a:bodyPr wrap="none" rtlCol="0">
+              <a:spAutoFit/>
+            </a:bodyPr>
+            <a:lstStyle/>
+            <a:p>
+              <a:r>
+                <a:rPr lang="en-US" altLang="zh-CN" sz="3600" dirty="0" err="1" smtClean="0">
+                  <a:solidFill>
+                    <a:srgbClr val="053972"/>
+                  </a:solidFill>
+                  <a:latin typeface="Arial Unicode MS" panose="020B0604020202020204" pitchFamily="34" charset="-122"/>
+                  <a:ea typeface="Arial Unicode MS" panose="020B0604020202020204" pitchFamily="34" charset="-122"/>
+                  <a:cs typeface="Arial Unicode MS" panose="020B0604020202020204" pitchFamily="34" charset="-122"/>
+                </a:rPr>
+                <a:t>AoE</a:t>
+              </a:r>
+              <a:r>
+                <a:rPr lang="en-US" altLang="zh-CN" sz="3600" dirty="0" smtClean="0">
+                  <a:solidFill>
+                    <a:srgbClr val="053972"/>
+                  </a:solidFill>
+                  <a:latin typeface="Arial Unicode MS" panose="020B0604020202020204" pitchFamily="34" charset="-122"/>
+                  <a:ea typeface="Arial Unicode MS" panose="020B0604020202020204" pitchFamily="34" charset="-122"/>
+                  <a:cs typeface="Arial Unicode MS" panose="020B0604020202020204" pitchFamily="34" charset="-122"/>
+                </a:rPr>
+                <a:t>/P-02/12</a:t>
+              </a:r>
+              <a:endParaRPr lang="zh-CN" altLang="en-US" sz="3600" dirty="0">
+                <a:solidFill>
+                  <a:srgbClr val="053972"/>
+                </a:solidFill>
+                <a:latin typeface="Arial Unicode MS" panose="020B0604020202020204" pitchFamily="34" charset="-122"/>
+                <a:ea typeface="Arial Unicode MS" panose="020B0604020202020204" pitchFamily="34" charset="-122"/>
+                <a:cs typeface="Arial Unicode MS" panose="020B0604020202020204" pitchFamily="34" charset="-122"/>
+              </a:endParaRPr>
+            </a:p>
+          </p:txBody>
+        </p:sp>
+      </p:grpSp>
     </p:spTree>
     <p:extLst>
       <p:ext uri="{BB962C8B-B14F-4D97-AF65-F5344CB8AC3E}">
@@ -4147,15 +4247,7 @@
             </a:r>
             <a:r>
               <a:rPr lang="en-US" altLang="zh-CN" sz="2400" b="1" dirty="0" smtClean="0"/>
-              <a:t>   </a:t>
-            </a:r>
-            <a:r>
-              <a:rPr lang="en-US" altLang="zh-CN" sz="2400" b="1" dirty="0" smtClean="0"/>
-              <a:t>14:30-17:50</a:t>
-            </a:r>
-            <a:r>
-              <a:rPr lang="en-US" altLang="zh-CN" sz="2400" b="1" dirty="0" smtClean="0"/>
-              <a:t>)</a:t>
+              <a:t>   14:30-17:50)</a:t>
             </a:r>
             <a:endParaRPr lang="zh-CN" altLang="en-US" sz="2400" b="1" dirty="0"/>
           </a:p>
@@ -5797,11 +5889,7 @@
             </a:r>
             <a:r>
               <a:rPr lang="en-US" altLang="zh-CN" sz="2400" b="1" dirty="0" smtClean="0"/>
-              <a:t> </a:t>
-            </a:r>
-            <a:r>
-              <a:rPr lang="en-US" altLang="zh-CN" sz="2400" b="1" dirty="0" smtClean="0"/>
-              <a:t>14:30-18:15)</a:t>
+              <a:t> 14:30-18:15)</a:t>
             </a:r>
             <a:endParaRPr lang="zh-CN" altLang="en-US" sz="2400" b="1" dirty="0"/>
           </a:p>

</xml_diff>